<commit_message>
update powerpoint and create a python code for SOM
</commit_message>
<xml_diff>
--- a/About self-organizing maps.pptx
+++ b/About self-organizing maps.pptx
@@ -5,10 +5,10 @@
     <p:sldMasterId id="2147483744" r:id="rId1"/>
   </p:sldMasterIdLst>
   <p:notesMasterIdLst>
-    <p:notesMasterId r:id="rId12"/>
+    <p:notesMasterId r:id="rId19"/>
   </p:notesMasterIdLst>
   <p:handoutMasterIdLst>
-    <p:handoutMasterId r:id="rId13"/>
+    <p:handoutMasterId r:id="rId20"/>
   </p:handoutMasterIdLst>
   <p:sldIdLst>
     <p:sldId id="256" r:id="rId2"/>
@@ -20,7 +20,14 @@
     <p:sldId id="263" r:id="rId8"/>
     <p:sldId id="264" r:id="rId9"/>
     <p:sldId id="265" r:id="rId10"/>
-    <p:sldId id="258" r:id="rId11"/>
+    <p:sldId id="269" r:id="rId11"/>
+    <p:sldId id="270" r:id="rId12"/>
+    <p:sldId id="271" r:id="rId13"/>
+    <p:sldId id="272" r:id="rId14"/>
+    <p:sldId id="266" r:id="rId15"/>
+    <p:sldId id="268" r:id="rId16"/>
+    <p:sldId id="267" r:id="rId17"/>
+    <p:sldId id="258" r:id="rId18"/>
   </p:sldIdLst>
   <p:sldSz cx="12192000" cy="6858000"/>
   <p:notesSz cx="6858000" cy="9144000"/>
@@ -119,6 +126,11 @@
       </a:defRPr>
     </a:lvl9pPr>
   </p:defaultTextStyle>
+  <p:extLst>
+    <p:ext uri="{EFAFB233-063F-42B5-8137-9DF3F51BA10A}">
+      <p15:sldGuideLst xmlns:p15="http://schemas.microsoft.com/office/powerpoint/2012/main"/>
+    </p:ext>
+  </p:extLst>
 </p:presentation>
 </file>
 
@@ -216,7 +228,7 @@
           <a:p>
             <a:fld id="{800E7057-C4EF-49D8-BBFD-715A9F95676F}" type="datetimeFigureOut">
               <a:rPr lang="en-US" smtClean="0"/>
-              <a:t>2/5/2024</a:t>
+              <a:t>2/6/2024</a:t>
             </a:fld>
             <a:endParaRPr lang="en-US" dirty="0"/>
           </a:p>
@@ -394,7 +406,7 @@
           <a:p>
             <a:fld id="{A2EE173F-994D-40E8-AAA1-00F71821258C}" type="datetimeFigureOut">
               <a:rPr lang="en-US" smtClean="0"/>
-              <a:t>2/5/2024</a:t>
+              <a:t>2/6/2024</a:t>
             </a:fld>
             <a:endParaRPr lang="en-US" dirty="0"/>
           </a:p>
@@ -1164,7 +1176,7 @@
           <a:p>
             <a:fld id="{C6FDFD1A-CF44-4D01-AFF2-6011E299487E}" type="datetimeFigureOut">
               <a:rPr lang="en-US" smtClean="0"/>
-              <a:t>2/5/2024</a:t>
+              <a:t>2/6/2024</a:t>
             </a:fld>
             <a:endParaRPr lang="en-US" dirty="0"/>
           </a:p>
@@ -1459,7 +1471,7 @@
           <a:p>
             <a:fld id="{C6FDFD1A-CF44-4D01-AFF2-6011E299487E}" type="datetimeFigureOut">
               <a:rPr lang="en-US" smtClean="0"/>
-              <a:t>2/5/2024</a:t>
+              <a:t>2/6/2024</a:t>
             </a:fld>
             <a:endParaRPr lang="en-US" dirty="0"/>
           </a:p>
@@ -1707,7 +1719,7 @@
           <a:p>
             <a:fld id="{C6FDFD1A-CF44-4D01-AFF2-6011E299487E}" type="datetimeFigureOut">
               <a:rPr lang="en-US" smtClean="0"/>
-              <a:t>2/5/2024</a:t>
+              <a:t>2/6/2024</a:t>
             </a:fld>
             <a:endParaRPr lang="en-US" dirty="0"/>
           </a:p>
@@ -2247,7 +2259,7 @@
           <a:p>
             <a:fld id="{C6FDFD1A-CF44-4D01-AFF2-6011E299487E}" type="datetimeFigureOut">
               <a:rPr lang="en-US" smtClean="0"/>
-              <a:t>2/5/2024</a:t>
+              <a:t>2/6/2024</a:t>
             </a:fld>
             <a:endParaRPr lang="en-US" dirty="0"/>
           </a:p>
@@ -2495,7 +2507,7 @@
           <a:p>
             <a:fld id="{C6FDFD1A-CF44-4D01-AFF2-6011E299487E}" type="datetimeFigureOut">
               <a:rPr lang="en-US" smtClean="0"/>
-              <a:t>2/5/2024</a:t>
+              <a:t>2/6/2024</a:t>
             </a:fld>
             <a:endParaRPr lang="en-US" dirty="0"/>
           </a:p>
@@ -3027,7 +3039,7 @@
           <a:p>
             <a:fld id="{C6FDFD1A-CF44-4D01-AFF2-6011E299487E}" type="datetimeFigureOut">
               <a:rPr lang="en-US" smtClean="0"/>
-              <a:t>2/5/2024</a:t>
+              <a:t>2/6/2024</a:t>
             </a:fld>
             <a:endParaRPr lang="en-US" dirty="0"/>
           </a:p>
@@ -3324,7 +3336,7 @@
           <a:p>
             <a:fld id="{C6FDFD1A-CF44-4D01-AFF2-6011E299487E}" type="datetimeFigureOut">
               <a:rPr lang="en-US" smtClean="0"/>
-              <a:t>2/5/2024</a:t>
+              <a:t>2/6/2024</a:t>
             </a:fld>
             <a:endParaRPr lang="en-US" dirty="0"/>
           </a:p>
@@ -3498,7 +3510,7 @@
           <a:p>
             <a:fld id="{C6FDFD1A-CF44-4D01-AFF2-6011E299487E}" type="datetimeFigureOut">
               <a:rPr lang="en-US" smtClean="0"/>
-              <a:t>2/5/2024</a:t>
+              <a:t>2/6/2024</a:t>
             </a:fld>
             <a:endParaRPr lang="en-US" dirty="0"/>
           </a:p>
@@ -3678,7 +3690,7 @@
           <a:p>
             <a:fld id="{C6FDFD1A-CF44-4D01-AFF2-6011E299487E}" type="datetimeFigureOut">
               <a:rPr lang="en-US" smtClean="0"/>
-              <a:t>2/5/2024</a:t>
+              <a:t>2/6/2024</a:t>
             </a:fld>
             <a:endParaRPr lang="en-US" dirty="0"/>
           </a:p>
@@ -3848,7 +3860,7 @@
           <a:p>
             <a:fld id="{C6FDFD1A-CF44-4D01-AFF2-6011E299487E}" type="datetimeFigureOut">
               <a:rPr lang="en-US" smtClean="0"/>
-              <a:t>2/5/2024</a:t>
+              <a:t>2/6/2024</a:t>
             </a:fld>
             <a:endParaRPr lang="en-US" dirty="0"/>
           </a:p>
@@ -4099,7 +4111,7 @@
           <a:p>
             <a:fld id="{C6FDFD1A-CF44-4D01-AFF2-6011E299487E}" type="datetimeFigureOut">
               <a:rPr lang="en-US" smtClean="0"/>
-              <a:t>2/5/2024</a:t>
+              <a:t>2/6/2024</a:t>
             </a:fld>
             <a:endParaRPr lang="en-US" dirty="0"/>
           </a:p>
@@ -4396,7 +4408,7 @@
           <a:p>
             <a:fld id="{C6FDFD1A-CF44-4D01-AFF2-6011E299487E}" type="datetimeFigureOut">
               <a:rPr lang="en-US" smtClean="0"/>
-              <a:t>2/5/2024</a:t>
+              <a:t>2/6/2024</a:t>
             </a:fld>
             <a:endParaRPr lang="en-US" dirty="0"/>
           </a:p>
@@ -4838,7 +4850,7 @@
           <a:p>
             <a:fld id="{C6FDFD1A-CF44-4D01-AFF2-6011E299487E}" type="datetimeFigureOut">
               <a:rPr lang="en-US" smtClean="0"/>
-              <a:t>2/5/2024</a:t>
+              <a:t>2/6/2024</a:t>
             </a:fld>
             <a:endParaRPr lang="en-US" dirty="0"/>
           </a:p>
@@ -4956,7 +4968,7 @@
           <a:p>
             <a:fld id="{C6FDFD1A-CF44-4D01-AFF2-6011E299487E}" type="datetimeFigureOut">
               <a:rPr lang="en-US" smtClean="0"/>
-              <a:t>2/5/2024</a:t>
+              <a:t>2/6/2024</a:t>
             </a:fld>
             <a:endParaRPr lang="en-US" dirty="0"/>
           </a:p>
@@ -5051,7 +5063,7 @@
           <a:p>
             <a:fld id="{C6FDFD1A-CF44-4D01-AFF2-6011E299487E}" type="datetimeFigureOut">
               <a:rPr lang="en-US" smtClean="0"/>
-              <a:t>2/5/2024</a:t>
+              <a:t>2/6/2024</a:t>
             </a:fld>
             <a:endParaRPr lang="en-US" dirty="0"/>
           </a:p>
@@ -5334,7 +5346,7 @@
           <a:p>
             <a:fld id="{C6FDFD1A-CF44-4D01-AFF2-6011E299487E}" type="datetimeFigureOut">
               <a:rPr lang="en-US" smtClean="0"/>
-              <a:t>2/5/2024</a:t>
+              <a:t>2/6/2024</a:t>
             </a:fld>
             <a:endParaRPr lang="en-US" dirty="0"/>
           </a:p>
@@ -5624,7 +5636,7 @@
           <a:p>
             <a:fld id="{C6FDFD1A-CF44-4D01-AFF2-6011E299487E}" type="datetimeFigureOut">
               <a:rPr lang="en-US" smtClean="0"/>
-              <a:t>2/5/2024</a:t>
+              <a:t>2/6/2024</a:t>
             </a:fld>
             <a:endParaRPr lang="en-US" dirty="0"/>
           </a:p>
@@ -6154,7 +6166,7 @@
           <a:p>
             <a:fld id="{C6FDFD1A-CF44-4D01-AFF2-6011E299487E}" type="datetimeFigureOut">
               <a:rPr lang="en-US" smtClean="0"/>
-              <a:t>2/5/2024</a:t>
+              <a:t>2/6/2024</a:t>
             </a:fld>
             <a:endParaRPr lang="en-US" dirty="0"/>
           </a:p>
@@ -6783,6 +6795,1136 @@
           <p:cNvPr id="2" name="Title 1">
             <a:extLst>
               <a:ext uri="{FF2B5EF4-FFF2-40B4-BE49-F238E27FC236}">
+                <a16:creationId xmlns:a16="http://schemas.microsoft.com/office/drawing/2014/main" id="{2C273EDB-7E42-4E45-A09B-9399C3F3ADF0}"/>
+              </a:ext>
+            </a:extLst>
+          </p:cNvPr>
+          <p:cNvSpPr>
+            <a:spLocks noGrp="1"/>
+          </p:cNvSpPr>
+          <p:nvPr>
+            <p:ph type="title"/>
+          </p:nvPr>
+        </p:nvSpPr>
+        <p:spPr>
+          <a:xfrm>
+            <a:off x="1484310" y="183777"/>
+            <a:ext cx="10018713" cy="605118"/>
+          </a:xfrm>
+        </p:spPr>
+        <p:txBody>
+          <a:bodyPr>
+            <a:normAutofit fontScale="90000"/>
+          </a:bodyPr>
+          <a:lstStyle/>
+          <a:p>
+            <a:r>
+              <a:rPr lang="en-US" dirty="0"/>
+              <a:t>Solution + code</a:t>
+            </a:r>
+          </a:p>
+        </p:txBody>
+      </p:sp>
+      <p:sp>
+        <p:nvSpPr>
+          <p:cNvPr id="3" name="Content Placeholder 2">
+            <a:extLst>
+              <a:ext uri="{FF2B5EF4-FFF2-40B4-BE49-F238E27FC236}">
+                <a16:creationId xmlns:a16="http://schemas.microsoft.com/office/drawing/2014/main" id="{70D350F8-1E4E-4490-A987-7EDE6D2107E5}"/>
+              </a:ext>
+            </a:extLst>
+          </p:cNvPr>
+          <p:cNvSpPr>
+            <a:spLocks noGrp="1"/>
+          </p:cNvSpPr>
+          <p:nvPr>
+            <p:ph idx="1"/>
+          </p:nvPr>
+        </p:nvSpPr>
+        <p:spPr>
+          <a:xfrm>
+            <a:off x="1484310" y="788895"/>
+            <a:ext cx="10018713" cy="5002305"/>
+          </a:xfrm>
+        </p:spPr>
+        <p:txBody>
+          <a:bodyPr anchor="t"/>
+          <a:lstStyle/>
+          <a:p>
+            <a:r>
+              <a:rPr lang="en-US" dirty="0"/>
+              <a:t>Firstly, we have to import our libraries:</a:t>
+            </a:r>
+          </a:p>
+          <a:p>
+            <a:endParaRPr lang="en-US" dirty="0"/>
+          </a:p>
+          <a:p>
+            <a:endParaRPr lang="en-US" dirty="0"/>
+          </a:p>
+          <a:p>
+            <a:r>
+              <a:rPr lang="en-US" dirty="0"/>
+              <a:t>Then, to open and read the data. We’ll use a .txt file with an English text without punctuation</a:t>
+            </a:r>
+          </a:p>
+          <a:p>
+            <a:endParaRPr lang="en-US" dirty="0"/>
+          </a:p>
+          <a:p>
+            <a:r>
+              <a:rPr lang="en-US" dirty="0"/>
+              <a:t>We have to transform our words list into vectors. For that, we’ll use TfidVectorizer from sklearn.</a:t>
+            </a:r>
+          </a:p>
+          <a:p>
+            <a:endParaRPr lang="en-US" dirty="0"/>
+          </a:p>
+          <a:p>
+            <a:endParaRPr lang="en-US" dirty="0"/>
+          </a:p>
+        </p:txBody>
+      </p:sp>
+      <p:pic>
+        <p:nvPicPr>
+          <p:cNvPr id="8" name="Picture 7">
+            <a:extLst>
+              <a:ext uri="{FF2B5EF4-FFF2-40B4-BE49-F238E27FC236}">
+                <a16:creationId xmlns:a16="http://schemas.microsoft.com/office/drawing/2014/main" id="{443D2E45-54BA-4B2E-8461-1BD0B10CDE4E}"/>
+              </a:ext>
+            </a:extLst>
+          </p:cNvPr>
+          <p:cNvPicPr>
+            <a:picLocks noChangeAspect="1"/>
+          </p:cNvPicPr>
+          <p:nvPr/>
+        </p:nvPicPr>
+        <p:blipFill>
+          <a:blip r:embed="rId2"/>
+          <a:stretch>
+            <a:fillRect/>
+          </a:stretch>
+        </p:blipFill>
+        <p:spPr>
+          <a:xfrm>
+            <a:off x="1982235" y="1243816"/>
+            <a:ext cx="4511431" cy="838273"/>
+          </a:xfrm>
+          <a:prstGeom prst="rect">
+            <a:avLst/>
+          </a:prstGeom>
+        </p:spPr>
+      </p:pic>
+      <p:pic>
+        <p:nvPicPr>
+          <p:cNvPr id="10" name="Picture 9">
+            <a:extLst>
+              <a:ext uri="{FF2B5EF4-FFF2-40B4-BE49-F238E27FC236}">
+                <a16:creationId xmlns:a16="http://schemas.microsoft.com/office/drawing/2014/main" id="{7C24EE6D-4737-4E63-A9F0-8C59867FA0E3}"/>
+              </a:ext>
+            </a:extLst>
+          </p:cNvPr>
+          <p:cNvPicPr>
+            <a:picLocks noChangeAspect="1"/>
+          </p:cNvPicPr>
+          <p:nvPr/>
+        </p:nvPicPr>
+        <p:blipFill>
+          <a:blip r:embed="rId3"/>
+          <a:stretch>
+            <a:fillRect/>
+          </a:stretch>
+        </p:blipFill>
+        <p:spPr>
+          <a:xfrm>
+            <a:off x="4660897" y="2788865"/>
+            <a:ext cx="3665538" cy="640135"/>
+          </a:xfrm>
+          <a:prstGeom prst="rect">
+            <a:avLst/>
+          </a:prstGeom>
+        </p:spPr>
+      </p:pic>
+      <p:pic>
+        <p:nvPicPr>
+          <p:cNvPr id="12" name="Picture 11">
+            <a:extLst>
+              <a:ext uri="{FF2B5EF4-FFF2-40B4-BE49-F238E27FC236}">
+                <a16:creationId xmlns:a16="http://schemas.microsoft.com/office/drawing/2014/main" id="{64F7DF8C-0F83-409F-9939-30E919CB6CCC}"/>
+              </a:ext>
+            </a:extLst>
+          </p:cNvPr>
+          <p:cNvPicPr>
+            <a:picLocks noChangeAspect="1"/>
+          </p:cNvPicPr>
+          <p:nvPr/>
+        </p:nvPicPr>
+        <p:blipFill>
+          <a:blip r:embed="rId4"/>
+          <a:stretch>
+            <a:fillRect/>
+          </a:stretch>
+        </p:blipFill>
+        <p:spPr>
+          <a:xfrm>
+            <a:off x="3276212" y="4775912"/>
+            <a:ext cx="3756986" cy="419136"/>
+          </a:xfrm>
+          <a:prstGeom prst="rect">
+            <a:avLst/>
+          </a:prstGeom>
+        </p:spPr>
+      </p:pic>
+    </p:spTree>
+    <p:extLst>
+      <p:ext uri="{BB962C8B-B14F-4D97-AF65-F5344CB8AC3E}">
+        <p14:creationId xmlns:p14="http://schemas.microsoft.com/office/powerpoint/2010/main" val="1751917300"/>
+      </p:ext>
+    </p:extLst>
+  </p:cSld>
+  <p:clrMapOvr>
+    <a:masterClrMapping/>
+  </p:clrMapOvr>
+</p:sld>
+</file>
+
+<file path=ppt/slides/slide11.xml><?xml version="1.0" encoding="utf-8"?>
+<p:sld xmlns:a="http://schemas.openxmlformats.org/drawingml/2006/main" xmlns:r="http://schemas.openxmlformats.org/officeDocument/2006/relationships" xmlns:p="http://schemas.openxmlformats.org/presentationml/2006/main">
+  <p:cSld>
+    <p:spTree>
+      <p:nvGrpSpPr>
+        <p:cNvPr id="1" name=""/>
+        <p:cNvGrpSpPr/>
+        <p:nvPr/>
+      </p:nvGrpSpPr>
+      <p:grpSpPr>
+        <a:xfrm>
+          <a:off x="0" y="0"/>
+          <a:ext cx="0" cy="0"/>
+          <a:chOff x="0" y="0"/>
+          <a:chExt cx="0" cy="0"/>
+        </a:xfrm>
+      </p:grpSpPr>
+      <p:sp>
+        <p:nvSpPr>
+          <p:cNvPr id="3" name="Content Placeholder 2">
+            <a:extLst>
+              <a:ext uri="{FF2B5EF4-FFF2-40B4-BE49-F238E27FC236}">
+                <a16:creationId xmlns:a16="http://schemas.microsoft.com/office/drawing/2014/main" id="{993D6435-4568-4419-BC4E-AE06E2D10E45}"/>
+              </a:ext>
+            </a:extLst>
+          </p:cNvPr>
+          <p:cNvSpPr>
+            <a:spLocks noGrp="1"/>
+          </p:cNvSpPr>
+          <p:nvPr>
+            <p:ph idx="1"/>
+          </p:nvPr>
+        </p:nvSpPr>
+        <p:spPr>
+          <a:xfrm>
+            <a:off x="1484310" y="242047"/>
+            <a:ext cx="10018713" cy="5549153"/>
+          </a:xfrm>
+        </p:spPr>
+        <p:txBody>
+          <a:bodyPr anchor="t"/>
+          <a:lstStyle/>
+          <a:p>
+            <a:r>
+              <a:rPr lang="en-US" dirty="0"/>
+              <a:t>Now we’ll initialize and train a SOM. As we can see, our SOM will be 1x6. Dimensions for SOM are represented by som_shape[0] and som_shape[1].</a:t>
+            </a:r>
+          </a:p>
+          <a:p>
+            <a:pPr marL="0" indent="0">
+              <a:buNone/>
+            </a:pPr>
+            <a:endParaRPr lang="en-US" dirty="0"/>
+          </a:p>
+          <a:p>
+            <a:endParaRPr lang="en-US" dirty="0"/>
+          </a:p>
+          <a:p>
+            <a:r>
+              <a:rPr lang="en-US" b="0" i="0" dirty="0">
+                <a:effectLst/>
+                <a:latin typeface="-apple-system"/>
+              </a:rPr>
+              <a:t>Now we will consider all the sample mapped into a specific neuron as a cluster. To identify each cluster more easily we will translate the bidimensional indexes of the neurons on the SOM into a mono-dimentional indexes </a:t>
+            </a:r>
+            <a:r>
+              <a:rPr lang="en-US" b="0" i="0" baseline="30000" dirty="0">
+                <a:effectLst/>
+                <a:latin typeface="-apple-system"/>
+                <a:hlinkClick r:id="rId2" action="ppaction://hlinksldjump"/>
+              </a:rPr>
+              <a:t>8</a:t>
+            </a:r>
+            <a:r>
+              <a:rPr lang="en-US" b="0" i="0" dirty="0">
+                <a:effectLst/>
+                <a:latin typeface="-apple-system"/>
+              </a:rPr>
+              <a:t>:</a:t>
+            </a:r>
+          </a:p>
+          <a:p>
+            <a:endParaRPr lang="en-US" dirty="0">
+              <a:latin typeface="-apple-system"/>
+            </a:endParaRPr>
+          </a:p>
+          <a:p>
+            <a:r>
+              <a:rPr lang="en-US" dirty="0"/>
+              <a:t>- with np.ravel_multi_index we convert the bidimensional coordinates to a mono-dimensional index</a:t>
+            </a:r>
+          </a:p>
+        </p:txBody>
+      </p:sp>
+      <p:pic>
+        <p:nvPicPr>
+          <p:cNvPr id="7" name="Picture 6">
+            <a:extLst>
+              <a:ext uri="{FF2B5EF4-FFF2-40B4-BE49-F238E27FC236}">
+                <a16:creationId xmlns:a16="http://schemas.microsoft.com/office/drawing/2014/main" id="{BE2D51BF-4E45-4FD6-8E8C-EFD075A7CBEE}"/>
+              </a:ext>
+            </a:extLst>
+          </p:cNvPr>
+          <p:cNvPicPr>
+            <a:picLocks noChangeAspect="1"/>
+          </p:cNvPicPr>
+          <p:nvPr/>
+        </p:nvPicPr>
+        <p:blipFill>
+          <a:blip r:embed="rId3"/>
+          <a:stretch>
+            <a:fillRect/>
+          </a:stretch>
+        </p:blipFill>
+        <p:spPr>
+          <a:xfrm>
+            <a:off x="1842630" y="1146999"/>
+            <a:ext cx="6713802" cy="807790"/>
+          </a:xfrm>
+          <a:prstGeom prst="rect">
+            <a:avLst/>
+          </a:prstGeom>
+        </p:spPr>
+      </p:pic>
+      <p:pic>
+        <p:nvPicPr>
+          <p:cNvPr id="9" name="Picture 8">
+            <a:extLst>
+              <a:ext uri="{FF2B5EF4-FFF2-40B4-BE49-F238E27FC236}">
+                <a16:creationId xmlns:a16="http://schemas.microsoft.com/office/drawing/2014/main" id="{D9A0E3B1-2422-478C-B87D-6B91E8DEE184}"/>
+              </a:ext>
+            </a:extLst>
+          </p:cNvPr>
+          <p:cNvPicPr>
+            <a:picLocks noChangeAspect="1"/>
+          </p:cNvPicPr>
+          <p:nvPr/>
+        </p:nvPicPr>
+        <p:blipFill>
+          <a:blip r:embed="rId4"/>
+          <a:stretch>
+            <a:fillRect/>
+          </a:stretch>
+        </p:blipFill>
+        <p:spPr>
+          <a:xfrm>
+            <a:off x="3299295" y="3419584"/>
+            <a:ext cx="7408395" cy="453410"/>
+          </a:xfrm>
+          <a:prstGeom prst="rect">
+            <a:avLst/>
+          </a:prstGeom>
+        </p:spPr>
+      </p:pic>
+    </p:spTree>
+    <p:extLst>
+      <p:ext uri="{BB962C8B-B14F-4D97-AF65-F5344CB8AC3E}">
+        <p14:creationId xmlns:p14="http://schemas.microsoft.com/office/powerpoint/2010/main" val="1085373943"/>
+      </p:ext>
+    </p:extLst>
+  </p:cSld>
+  <p:clrMapOvr>
+    <a:masterClrMapping/>
+  </p:clrMapOvr>
+</p:sld>
+</file>
+
+<file path=ppt/slides/slide12.xml><?xml version="1.0" encoding="utf-8"?>
+<p:sld xmlns:a="http://schemas.openxmlformats.org/drawingml/2006/main" xmlns:r="http://schemas.openxmlformats.org/officeDocument/2006/relationships" xmlns:p="http://schemas.openxmlformats.org/presentationml/2006/main">
+  <p:cSld>
+    <p:spTree>
+      <p:nvGrpSpPr>
+        <p:cNvPr id="1" name=""/>
+        <p:cNvGrpSpPr/>
+        <p:nvPr/>
+      </p:nvGrpSpPr>
+      <p:grpSpPr>
+        <a:xfrm>
+          <a:off x="0" y="0"/>
+          <a:ext cx="0" cy="0"/>
+          <a:chOff x="0" y="0"/>
+          <a:chExt cx="0" cy="0"/>
+        </a:xfrm>
+      </p:grpSpPr>
+      <p:sp>
+        <p:nvSpPr>
+          <p:cNvPr id="3" name="Content Placeholder 2">
+            <a:extLst>
+              <a:ext uri="{FF2B5EF4-FFF2-40B4-BE49-F238E27FC236}">
+                <a16:creationId xmlns:a16="http://schemas.microsoft.com/office/drawing/2014/main" id="{FF1DC166-BBEA-4015-B812-25E9AC1F3E25}"/>
+              </a:ext>
+            </a:extLst>
+          </p:cNvPr>
+          <p:cNvSpPr>
+            <a:spLocks noGrp="1"/>
+          </p:cNvSpPr>
+          <p:nvPr>
+            <p:ph idx="1"/>
+          </p:nvPr>
+        </p:nvSpPr>
+        <p:spPr>
+          <a:xfrm>
+            <a:off x="1573958" y="493060"/>
+            <a:ext cx="10018713" cy="5638800"/>
+          </a:xfrm>
+        </p:spPr>
+        <p:txBody>
+          <a:bodyPr anchor="t"/>
+          <a:lstStyle/>
+          <a:p>
+            <a:r>
+              <a:rPr lang="en-US" dirty="0"/>
+              <a:t>Now, the operation for SOM are ready. We can write some lines for showing us the answers and, eventually, to plot them.</a:t>
+            </a:r>
+          </a:p>
+          <a:p>
+            <a:endParaRPr lang="en-US" dirty="0"/>
+          </a:p>
+        </p:txBody>
+      </p:sp>
+      <p:pic>
+        <p:nvPicPr>
+          <p:cNvPr id="5" name="Picture 4">
+            <a:extLst>
+              <a:ext uri="{FF2B5EF4-FFF2-40B4-BE49-F238E27FC236}">
+                <a16:creationId xmlns:a16="http://schemas.microsoft.com/office/drawing/2014/main" id="{E5D84402-2EC9-40A5-8692-93E5F1F58188}"/>
+              </a:ext>
+            </a:extLst>
+          </p:cNvPr>
+          <p:cNvPicPr>
+            <a:picLocks noChangeAspect="1"/>
+          </p:cNvPicPr>
+          <p:nvPr/>
+        </p:nvPicPr>
+        <p:blipFill>
+          <a:blip r:embed="rId2"/>
+          <a:stretch>
+            <a:fillRect/>
+          </a:stretch>
+        </p:blipFill>
+        <p:spPr>
+          <a:xfrm>
+            <a:off x="1862044" y="1548277"/>
+            <a:ext cx="8611346" cy="3528366"/>
+          </a:xfrm>
+          <a:prstGeom prst="rect">
+            <a:avLst/>
+          </a:prstGeom>
+        </p:spPr>
+      </p:pic>
+    </p:spTree>
+    <p:extLst>
+      <p:ext uri="{BB962C8B-B14F-4D97-AF65-F5344CB8AC3E}">
+        <p14:creationId xmlns:p14="http://schemas.microsoft.com/office/powerpoint/2010/main" val="3472016967"/>
+      </p:ext>
+    </p:extLst>
+  </p:cSld>
+  <p:clrMapOvr>
+    <a:masterClrMapping/>
+  </p:clrMapOvr>
+</p:sld>
+</file>
+
+<file path=ppt/slides/slide13.xml><?xml version="1.0" encoding="utf-8"?>
+<p:sld xmlns:a="http://schemas.openxmlformats.org/drawingml/2006/main" xmlns:r="http://schemas.openxmlformats.org/officeDocument/2006/relationships" xmlns:p="http://schemas.openxmlformats.org/presentationml/2006/main">
+  <p:cSld>
+    <p:spTree>
+      <p:nvGrpSpPr>
+        <p:cNvPr id="1" name=""/>
+        <p:cNvGrpSpPr/>
+        <p:nvPr/>
+      </p:nvGrpSpPr>
+      <p:grpSpPr>
+        <a:xfrm>
+          <a:off x="0" y="0"/>
+          <a:ext cx="0" cy="0"/>
+          <a:chOff x="0" y="0"/>
+          <a:chExt cx="0" cy="0"/>
+        </a:xfrm>
+      </p:grpSpPr>
+      <p:sp>
+        <p:nvSpPr>
+          <p:cNvPr id="2" name="Title 1">
+            <a:extLst>
+              <a:ext uri="{FF2B5EF4-FFF2-40B4-BE49-F238E27FC236}">
+                <a16:creationId xmlns:a16="http://schemas.microsoft.com/office/drawing/2014/main" id="{6624A551-ABE7-4308-82BB-D34A394427FE}"/>
+              </a:ext>
+            </a:extLst>
+          </p:cNvPr>
+          <p:cNvSpPr>
+            <a:spLocks noGrp="1"/>
+          </p:cNvSpPr>
+          <p:nvPr>
+            <p:ph type="title"/>
+          </p:nvPr>
+        </p:nvSpPr>
+        <p:spPr>
+          <a:xfrm>
+            <a:off x="1340875" y="197224"/>
+            <a:ext cx="10018713" cy="797858"/>
+          </a:xfrm>
+        </p:spPr>
+        <p:txBody>
+          <a:bodyPr/>
+          <a:lstStyle/>
+          <a:p>
+            <a:r>
+              <a:rPr lang="en-US" dirty="0"/>
+              <a:t>Input/Output example</a:t>
+            </a:r>
+          </a:p>
+        </p:txBody>
+      </p:sp>
+      <p:sp>
+        <p:nvSpPr>
+          <p:cNvPr id="3" name="Content Placeholder 2">
+            <a:extLst>
+              <a:ext uri="{FF2B5EF4-FFF2-40B4-BE49-F238E27FC236}">
+                <a16:creationId xmlns:a16="http://schemas.microsoft.com/office/drawing/2014/main" id="{AC69D044-07BA-4933-8850-6C7BB711457B}"/>
+              </a:ext>
+            </a:extLst>
+          </p:cNvPr>
+          <p:cNvSpPr>
+            <a:spLocks noGrp="1"/>
+          </p:cNvSpPr>
+          <p:nvPr>
+            <p:ph idx="1"/>
+          </p:nvPr>
+        </p:nvSpPr>
+        <p:spPr>
+          <a:xfrm>
+            <a:off x="1484310" y="1120589"/>
+            <a:ext cx="10018713" cy="4670612"/>
+          </a:xfrm>
+        </p:spPr>
+        <p:txBody>
+          <a:bodyPr anchor="t"/>
+          <a:lstStyle/>
+          <a:p>
+            <a:r>
+              <a:rPr lang="en-US" dirty="0"/>
+              <a:t>Consider as input the following text in English, without serious punctuation.</a:t>
+            </a:r>
+          </a:p>
+          <a:p>
+            <a:pPr marL="0" indent="0">
+              <a:buNone/>
+            </a:pPr>
+            <a:r>
+              <a:rPr lang="en-US" baseline="-25000" dirty="0"/>
+              <a:t>          there are many variations of passages of lorem ipsum available but the majority have suffered alteration in some    	form by injected humour or randomised words which </a:t>
+            </a:r>
+          </a:p>
+          <a:p>
+            <a:endParaRPr lang="en-US" dirty="0"/>
+          </a:p>
+          <a:p>
+            <a:r>
+              <a:rPr lang="en-US" dirty="0"/>
+              <a:t>After using the code presented before, we’ll get the next results:</a:t>
+            </a:r>
+          </a:p>
+          <a:p>
+            <a:pPr marL="457200" lvl="1" indent="0">
+              <a:buNone/>
+            </a:pPr>
+            <a:endParaRPr lang="en-US" dirty="0"/>
+          </a:p>
+        </p:txBody>
+      </p:sp>
+      <p:pic>
+        <p:nvPicPr>
+          <p:cNvPr id="5" name="Picture 4">
+            <a:extLst>
+              <a:ext uri="{FF2B5EF4-FFF2-40B4-BE49-F238E27FC236}">
+                <a16:creationId xmlns:a16="http://schemas.microsoft.com/office/drawing/2014/main" id="{A0D3341B-E938-4BD7-851C-6393A7A08AD9}"/>
+              </a:ext>
+            </a:extLst>
+          </p:cNvPr>
+          <p:cNvPicPr>
+            <a:picLocks noChangeAspect="1"/>
+          </p:cNvPicPr>
+          <p:nvPr/>
+        </p:nvPicPr>
+        <p:blipFill>
+          <a:blip r:embed="rId2"/>
+          <a:stretch>
+            <a:fillRect/>
+          </a:stretch>
+        </p:blipFill>
+        <p:spPr>
+          <a:xfrm>
+            <a:off x="2058050" y="3227294"/>
+            <a:ext cx="2922292" cy="2894878"/>
+          </a:xfrm>
+          <a:prstGeom prst="rect">
+            <a:avLst/>
+          </a:prstGeom>
+        </p:spPr>
+      </p:pic>
+      <p:pic>
+        <p:nvPicPr>
+          <p:cNvPr id="7" name="Picture 6">
+            <a:extLst>
+              <a:ext uri="{FF2B5EF4-FFF2-40B4-BE49-F238E27FC236}">
+                <a16:creationId xmlns:a16="http://schemas.microsoft.com/office/drawing/2014/main" id="{3EB205C3-AA4A-48A7-92F3-311C53F1D415}"/>
+              </a:ext>
+            </a:extLst>
+          </p:cNvPr>
+          <p:cNvPicPr>
+            <a:picLocks noChangeAspect="1"/>
+          </p:cNvPicPr>
+          <p:nvPr/>
+        </p:nvPicPr>
+        <p:blipFill>
+          <a:blip r:embed="rId3"/>
+          <a:stretch>
+            <a:fillRect/>
+          </a:stretch>
+        </p:blipFill>
+        <p:spPr>
+          <a:xfrm>
+            <a:off x="5373666" y="3740675"/>
+            <a:ext cx="5227773" cy="1653683"/>
+          </a:xfrm>
+          <a:prstGeom prst="rect">
+            <a:avLst/>
+          </a:prstGeom>
+        </p:spPr>
+      </p:pic>
+    </p:spTree>
+    <p:extLst>
+      <p:ext uri="{BB962C8B-B14F-4D97-AF65-F5344CB8AC3E}">
+        <p14:creationId xmlns:p14="http://schemas.microsoft.com/office/powerpoint/2010/main" val="3470508135"/>
+      </p:ext>
+    </p:extLst>
+  </p:cSld>
+  <p:clrMapOvr>
+    <a:masterClrMapping/>
+  </p:clrMapOvr>
+</p:sld>
+</file>
+
+<file path=ppt/slides/slide14.xml><?xml version="1.0" encoding="utf-8"?>
+<p:sld xmlns:a="http://schemas.openxmlformats.org/drawingml/2006/main" xmlns:r="http://schemas.openxmlformats.org/officeDocument/2006/relationships" xmlns:p="http://schemas.openxmlformats.org/presentationml/2006/main">
+  <p:cSld>
+    <p:spTree>
+      <p:nvGrpSpPr>
+        <p:cNvPr id="1" name=""/>
+        <p:cNvGrpSpPr/>
+        <p:nvPr/>
+      </p:nvGrpSpPr>
+      <p:grpSpPr>
+        <a:xfrm>
+          <a:off x="0" y="0"/>
+          <a:ext cx="0" cy="0"/>
+          <a:chOff x="0" y="0"/>
+          <a:chExt cx="0" cy="0"/>
+        </a:xfrm>
+      </p:grpSpPr>
+      <p:sp>
+        <p:nvSpPr>
+          <p:cNvPr id="2" name="Title 1">
+            <a:extLst>
+              <a:ext uri="{FF2B5EF4-FFF2-40B4-BE49-F238E27FC236}">
+                <a16:creationId xmlns:a16="http://schemas.microsoft.com/office/drawing/2014/main" id="{3C1B97C6-C2BC-4047-8268-FB8B45A70560}"/>
+              </a:ext>
+            </a:extLst>
+          </p:cNvPr>
+          <p:cNvSpPr>
+            <a:spLocks noGrp="1"/>
+          </p:cNvSpPr>
+          <p:nvPr>
+            <p:ph type="title"/>
+          </p:nvPr>
+        </p:nvSpPr>
+        <p:spPr>
+          <a:xfrm>
+            <a:off x="1484309" y="1"/>
+            <a:ext cx="10018713" cy="1066800"/>
+          </a:xfrm>
+        </p:spPr>
+        <p:txBody>
+          <a:bodyPr/>
+          <a:lstStyle/>
+          <a:p>
+            <a:r>
+              <a:rPr lang="en-US" dirty="0"/>
+              <a:t>Questions</a:t>
+            </a:r>
+          </a:p>
+        </p:txBody>
+      </p:sp>
+      <p:sp>
+        <p:nvSpPr>
+          <p:cNvPr id="3" name="Content Placeholder 2">
+            <a:extLst>
+              <a:ext uri="{FF2B5EF4-FFF2-40B4-BE49-F238E27FC236}">
+                <a16:creationId xmlns:a16="http://schemas.microsoft.com/office/drawing/2014/main" id="{D4E97779-950A-4B9F-A13A-C60A1BDE3DA5}"/>
+              </a:ext>
+            </a:extLst>
+          </p:cNvPr>
+          <p:cNvSpPr>
+            <a:spLocks noGrp="1"/>
+          </p:cNvSpPr>
+          <p:nvPr>
+            <p:ph idx="1"/>
+          </p:nvPr>
+        </p:nvSpPr>
+        <p:spPr>
+          <a:xfrm>
+            <a:off x="1484310" y="995083"/>
+            <a:ext cx="10018713" cy="4796118"/>
+          </a:xfrm>
+        </p:spPr>
+        <p:txBody>
+          <a:bodyPr anchor="t">
+            <a:normAutofit/>
+          </a:bodyPr>
+          <a:lstStyle/>
+          <a:p>
+            <a:pPr marL="0" indent="0">
+              <a:buNone/>
+            </a:pPr>
+            <a:r>
+              <a:rPr lang="en-US" dirty="0"/>
+              <a:t>Q1: If we would provide as input a large chunk of text without whitespace, would the network be able to train to identify word boundaries?</a:t>
+            </a:r>
+          </a:p>
+          <a:p>
+            <a:pPr marL="0" indent="0">
+              <a:buNone/>
+            </a:pPr>
+            <a:r>
+              <a:rPr lang="en-US" dirty="0"/>
+              <a:t>* Before answering this question, we must consider the following factors:</a:t>
+            </a:r>
+          </a:p>
+          <a:p>
+            <a:pPr marL="0" indent="0">
+              <a:buNone/>
+            </a:pPr>
+            <a:r>
+              <a:rPr lang="en-US" sz="2200" dirty="0"/>
+              <a:t>     - </a:t>
+            </a:r>
+            <a:r>
+              <a:rPr lang="en-US" sz="2200" b="1" dirty="0"/>
+              <a:t>Ambiguity</a:t>
+            </a:r>
+            <a:r>
+              <a:rPr lang="en-US" sz="2200" dirty="0"/>
+              <a:t>: Because the structure of words is significantly variable in all languages, it is difficult to know how a word looks correctly in a specific language.</a:t>
+            </a:r>
+            <a:r>
+              <a:rPr lang="en-US" sz="2200" baseline="30000" dirty="0">
+                <a:hlinkClick r:id="rId2" action="ppaction://hlinksldjump"/>
+              </a:rPr>
+              <a:t>5</a:t>
+            </a:r>
+            <a:endParaRPr lang="en-US" sz="2200" baseline="30000" dirty="0"/>
+          </a:p>
+          <a:p>
+            <a:pPr marL="0" indent="0">
+              <a:buNone/>
+            </a:pPr>
+            <a:r>
+              <a:rPr lang="en-US" sz="2200" dirty="0"/>
+              <a:t>     - </a:t>
+            </a:r>
+            <a:r>
+              <a:rPr lang="en-US" sz="2200" b="1" dirty="0"/>
+              <a:t>Complexity</a:t>
+            </a:r>
+            <a:r>
+              <a:rPr lang="en-US" sz="2200" dirty="0"/>
+              <a:t>: Such an identification for an algorithm that is not intended for this area can be costly from a computational point of view, especially in the case of languages with complex morphology.</a:t>
+            </a:r>
+          </a:p>
+          <a:p>
+            <a:pPr marL="0" indent="0">
+              <a:buNone/>
+            </a:pPr>
+            <a:r>
+              <a:rPr lang="en-US" sz="2200" dirty="0"/>
+              <a:t>     - </a:t>
+            </a:r>
+            <a:r>
+              <a:rPr lang="en-US" sz="2200" b="1" dirty="0"/>
+              <a:t>Lack of supervision</a:t>
+            </a:r>
+            <a:r>
+              <a:rPr lang="en-US" sz="2200" dirty="0"/>
+              <a:t>: If the training data does not include any information about word boundaries, the network will have to learn them implicitly from the data. This can be difficult because there can be many different patterns that can be used to identify word boundaries.</a:t>
+            </a:r>
+          </a:p>
+        </p:txBody>
+      </p:sp>
+    </p:spTree>
+    <p:extLst>
+      <p:ext uri="{BB962C8B-B14F-4D97-AF65-F5344CB8AC3E}">
+        <p14:creationId xmlns:p14="http://schemas.microsoft.com/office/powerpoint/2010/main" val="266402546"/>
+      </p:ext>
+    </p:extLst>
+  </p:cSld>
+  <p:clrMapOvr>
+    <a:masterClrMapping/>
+  </p:clrMapOvr>
+</p:sld>
+</file>
+
+<file path=ppt/slides/slide15.xml><?xml version="1.0" encoding="utf-8"?>
+<p:sld xmlns:a="http://schemas.openxmlformats.org/drawingml/2006/main" xmlns:r="http://schemas.openxmlformats.org/officeDocument/2006/relationships" xmlns:p="http://schemas.openxmlformats.org/presentationml/2006/main">
+  <p:cSld>
+    <p:spTree>
+      <p:nvGrpSpPr>
+        <p:cNvPr id="1" name=""/>
+        <p:cNvGrpSpPr/>
+        <p:nvPr/>
+      </p:nvGrpSpPr>
+      <p:grpSpPr>
+        <a:xfrm>
+          <a:off x="0" y="0"/>
+          <a:ext cx="0" cy="0"/>
+          <a:chOff x="0" y="0"/>
+          <a:chExt cx="0" cy="0"/>
+        </a:xfrm>
+      </p:grpSpPr>
+      <p:sp>
+        <p:nvSpPr>
+          <p:cNvPr id="2" name="Title 1">
+            <a:extLst>
+              <a:ext uri="{FF2B5EF4-FFF2-40B4-BE49-F238E27FC236}">
+                <a16:creationId xmlns:a16="http://schemas.microsoft.com/office/drawing/2014/main" id="{CFDBE9E9-6D86-4B6C-AF0B-93D807587907}"/>
+              </a:ext>
+            </a:extLst>
+          </p:cNvPr>
+          <p:cNvSpPr>
+            <a:spLocks noGrp="1"/>
+          </p:cNvSpPr>
+          <p:nvPr>
+            <p:ph type="title"/>
+          </p:nvPr>
+        </p:nvSpPr>
+        <p:spPr>
+          <a:xfrm>
+            <a:off x="1484309" y="385483"/>
+            <a:ext cx="10018713" cy="887506"/>
+          </a:xfrm>
+        </p:spPr>
+        <p:txBody>
+          <a:bodyPr>
+            <a:noAutofit/>
+          </a:bodyPr>
+          <a:lstStyle/>
+          <a:p>
+            <a:r>
+              <a:rPr lang="en-US" dirty="0"/>
+              <a:t>Questions</a:t>
+            </a:r>
+            <a:br>
+              <a:rPr lang="en-US" dirty="0"/>
+            </a:br>
+            <a:endParaRPr lang="en-US" dirty="0"/>
+          </a:p>
+        </p:txBody>
+      </p:sp>
+      <p:sp>
+        <p:nvSpPr>
+          <p:cNvPr id="3" name="Content Placeholder 2">
+            <a:extLst>
+              <a:ext uri="{FF2B5EF4-FFF2-40B4-BE49-F238E27FC236}">
+                <a16:creationId xmlns:a16="http://schemas.microsoft.com/office/drawing/2014/main" id="{757F2F5B-EED6-40F5-8776-8D19A393B01E}"/>
+              </a:ext>
+            </a:extLst>
+          </p:cNvPr>
+          <p:cNvSpPr>
+            <a:spLocks noGrp="1"/>
+          </p:cNvSpPr>
+          <p:nvPr>
+            <p:ph idx="1"/>
+          </p:nvPr>
+        </p:nvSpPr>
+        <p:spPr>
+          <a:xfrm>
+            <a:off x="1484310" y="1039907"/>
+            <a:ext cx="10018713" cy="4751294"/>
+          </a:xfrm>
+        </p:spPr>
+        <p:txBody>
+          <a:bodyPr anchor="t"/>
+          <a:lstStyle/>
+          <a:p>
+            <a:r>
+              <a:rPr lang="en-US" dirty="0"/>
+              <a:t>Q2: Can we use a SOM instead of an Attention layer in a transformer?</a:t>
+            </a:r>
+          </a:p>
+        </p:txBody>
+      </p:sp>
+    </p:spTree>
+    <p:extLst>
+      <p:ext uri="{BB962C8B-B14F-4D97-AF65-F5344CB8AC3E}">
+        <p14:creationId xmlns:p14="http://schemas.microsoft.com/office/powerpoint/2010/main" val="3338674485"/>
+      </p:ext>
+    </p:extLst>
+  </p:cSld>
+  <p:clrMapOvr>
+    <a:masterClrMapping/>
+  </p:clrMapOvr>
+</p:sld>
+</file>
+
+<file path=ppt/slides/slide16.xml><?xml version="1.0" encoding="utf-8"?>
+<p:sld xmlns:a="http://schemas.openxmlformats.org/drawingml/2006/main" xmlns:r="http://schemas.openxmlformats.org/officeDocument/2006/relationships" xmlns:p="http://schemas.openxmlformats.org/presentationml/2006/main">
+  <p:cSld>
+    <p:spTree>
+      <p:nvGrpSpPr>
+        <p:cNvPr id="1" name=""/>
+        <p:cNvGrpSpPr/>
+        <p:nvPr/>
+      </p:nvGrpSpPr>
+      <p:grpSpPr>
+        <a:xfrm>
+          <a:off x="0" y="0"/>
+          <a:ext cx="0" cy="0"/>
+          <a:chOff x="0" y="0"/>
+          <a:chExt cx="0" cy="0"/>
+        </a:xfrm>
+      </p:grpSpPr>
+      <p:sp>
+        <p:nvSpPr>
+          <p:cNvPr id="2" name="Title 1">
+            <a:extLst>
+              <a:ext uri="{FF2B5EF4-FFF2-40B4-BE49-F238E27FC236}">
+                <a16:creationId xmlns:a16="http://schemas.microsoft.com/office/drawing/2014/main" id="{56F643B3-D4D6-4323-A0CA-22427ABCDFBB}"/>
+              </a:ext>
+            </a:extLst>
+          </p:cNvPr>
+          <p:cNvSpPr>
+            <a:spLocks noGrp="1"/>
+          </p:cNvSpPr>
+          <p:nvPr>
+            <p:ph type="title"/>
+          </p:nvPr>
+        </p:nvSpPr>
+        <p:spPr>
+          <a:xfrm>
+            <a:off x="1331911" y="170330"/>
+            <a:ext cx="10018713" cy="753035"/>
+          </a:xfrm>
+        </p:spPr>
+        <p:txBody>
+          <a:bodyPr/>
+          <a:lstStyle/>
+          <a:p>
+            <a:r>
+              <a:rPr lang="en-US" dirty="0"/>
+              <a:t>Questions</a:t>
+            </a:r>
+          </a:p>
+        </p:txBody>
+      </p:sp>
+      <p:sp>
+        <p:nvSpPr>
+          <p:cNvPr id="3" name="Content Placeholder 2">
+            <a:extLst>
+              <a:ext uri="{FF2B5EF4-FFF2-40B4-BE49-F238E27FC236}">
+                <a16:creationId xmlns:a16="http://schemas.microsoft.com/office/drawing/2014/main" id="{8EBF4309-9B2C-47B7-B120-2F51123D4343}"/>
+              </a:ext>
+            </a:extLst>
+          </p:cNvPr>
+          <p:cNvSpPr>
+            <a:spLocks noGrp="1"/>
+          </p:cNvSpPr>
+          <p:nvPr>
+            <p:ph idx="1"/>
+          </p:nvPr>
+        </p:nvSpPr>
+        <p:spPr>
+          <a:xfrm>
+            <a:off x="1502240" y="1021976"/>
+            <a:ext cx="10018713" cy="5136776"/>
+          </a:xfrm>
+        </p:spPr>
+        <p:txBody>
+          <a:bodyPr anchor="t">
+            <a:normAutofit fontScale="92500" lnSpcReduction="10000"/>
+          </a:bodyPr>
+          <a:lstStyle/>
+          <a:p>
+            <a:r>
+              <a:rPr lang="en-US" dirty="0"/>
+              <a:t>Q3: What other uses may we find of SOMs in current deep learning?</a:t>
+            </a:r>
+          </a:p>
+          <a:p>
+            <a:pPr algn="just"/>
+            <a:endParaRPr lang="en-US" dirty="0"/>
+          </a:p>
+          <a:p>
+            <a:pPr algn="just"/>
+            <a:r>
+              <a:rPr lang="en-US" dirty="0"/>
+              <a:t>A1: </a:t>
+            </a:r>
+            <a:r>
+              <a:rPr lang="en-US" sz="2200" dirty="0"/>
+              <a:t>The SOM can be used to </a:t>
+            </a:r>
+            <a:r>
+              <a:rPr lang="en-US" sz="2200" b="1" dirty="0"/>
+              <a:t>detect anomalies </a:t>
+            </a:r>
+            <a:r>
+              <a:rPr lang="en-US" sz="2200" dirty="0"/>
+              <a:t>by calculating the </a:t>
+            </a:r>
+            <a:r>
+              <a:rPr lang="en-US" sz="2200" b="1" dirty="0"/>
+              <a:t>quantization error</a:t>
+            </a:r>
+            <a:r>
+              <a:rPr lang="en-US" sz="2200" dirty="0"/>
+              <a:t>: small errors below a threshold are considered normal, while errors above are considered anomalous. </a:t>
+            </a:r>
+            <a:r>
+              <a:rPr lang="en-US" sz="2200" b="1" dirty="0"/>
+              <a:t>Quantization error </a:t>
+            </a:r>
+            <a:r>
+              <a:rPr lang="en-US" sz="2200" dirty="0"/>
+              <a:t>based approaches were already used for tasks such as network monitoring and anomaly detection in industrial processes</a:t>
+            </a:r>
+            <a:r>
+              <a:rPr lang="ro-RO" sz="2200" dirty="0"/>
+              <a:t>. </a:t>
+            </a:r>
+            <a:r>
+              <a:rPr lang="en-US" sz="2200" dirty="0"/>
+              <a:t>The </a:t>
+            </a:r>
+            <a:r>
+              <a:rPr lang="en-US" sz="2200" b="1" dirty="0"/>
+              <a:t>quantization error </a:t>
+            </a:r>
+            <a:r>
+              <a:rPr lang="en-US" sz="2200" dirty="0"/>
+              <a:t>(Definition 2) of each sample is calculated by mapping it to the SOM to get its BMU. The distance of the sample to the BMU’s weight vector is the quantization error.</a:t>
+            </a:r>
+            <a:r>
+              <a:rPr lang="ro-RO" sz="2200" dirty="0"/>
+              <a:t> </a:t>
+            </a:r>
+            <a:r>
+              <a:rPr lang="ro-RO" sz="2000" baseline="30000" dirty="0">
+                <a:hlinkClick r:id="rId2" action="ppaction://hlinksldjump"/>
+              </a:rPr>
+              <a:t>6</a:t>
+            </a:r>
+            <a:endParaRPr lang="ro-RO" sz="2000" baseline="30000" dirty="0"/>
+          </a:p>
+          <a:p>
+            <a:pPr algn="just"/>
+            <a:endParaRPr lang="ro-RO" sz="2000" baseline="30000" dirty="0"/>
+          </a:p>
+          <a:p>
+            <a:pPr algn="just"/>
+            <a:r>
+              <a:rPr lang="en-US" sz="2200" dirty="0"/>
+              <a:t>A2</a:t>
+            </a:r>
+            <a:r>
+              <a:rPr lang="en-US" sz="2800" dirty="0"/>
+              <a:t>: </a:t>
+            </a:r>
+            <a:r>
+              <a:rPr lang="en-US" sz="2200" dirty="0"/>
+              <a:t>It can be used also for </a:t>
+            </a:r>
+            <a:r>
+              <a:rPr lang="en-US" sz="2200" b="1" dirty="0"/>
+              <a:t>detecting communities </a:t>
+            </a:r>
+            <a:r>
+              <a:rPr lang="en-US" sz="2200" dirty="0"/>
+              <a:t>from complex networks. This is an important issue and has attracted attention of researchers in many fields. It is relevant to social tasks, biological inquiries, and technological problems since various networks exist in these systems. By adopting a new operation and a new weight-updating scheme, a complex network can be organized into dense subgraphs according to the topological connection of each node by the SOM algorithm</a:t>
+            </a:r>
+            <a:r>
+              <a:rPr lang="en-US" dirty="0"/>
+              <a:t>. </a:t>
+            </a:r>
+            <a:r>
+              <a:rPr lang="en-US" baseline="30000" dirty="0">
+                <a:hlinkClick r:id="rId2" action="ppaction://hlinksldjump"/>
+              </a:rPr>
+              <a:t> 7</a:t>
+            </a:r>
+            <a:endParaRPr lang="en-US" sz="3200" baseline="30000" dirty="0"/>
+          </a:p>
+        </p:txBody>
+      </p:sp>
+    </p:spTree>
+    <p:extLst>
+      <p:ext uri="{BB962C8B-B14F-4D97-AF65-F5344CB8AC3E}">
+        <p14:creationId xmlns:p14="http://schemas.microsoft.com/office/powerpoint/2010/main" val="1004162751"/>
+      </p:ext>
+    </p:extLst>
+  </p:cSld>
+  <p:clrMapOvr>
+    <a:masterClrMapping/>
+  </p:clrMapOvr>
+</p:sld>
+</file>
+
+<file path=ppt/slides/slide17.xml><?xml version="1.0" encoding="utf-8"?>
+<p:sld xmlns:a="http://schemas.openxmlformats.org/drawingml/2006/main" xmlns:r="http://schemas.openxmlformats.org/officeDocument/2006/relationships" xmlns:p="http://schemas.openxmlformats.org/presentationml/2006/main">
+  <p:cSld>
+    <p:spTree>
+      <p:nvGrpSpPr>
+        <p:cNvPr id="1" name=""/>
+        <p:cNvGrpSpPr/>
+        <p:nvPr/>
+      </p:nvGrpSpPr>
+      <p:grpSpPr>
+        <a:xfrm>
+          <a:off x="0" y="0"/>
+          <a:ext cx="0" cy="0"/>
+          <a:chOff x="0" y="0"/>
+          <a:chExt cx="0" cy="0"/>
+        </a:xfrm>
+      </p:grpSpPr>
+      <p:sp>
+        <p:nvSpPr>
+          <p:cNvPr id="2" name="Title 1">
+            <a:extLst>
+              <a:ext uri="{FF2B5EF4-FFF2-40B4-BE49-F238E27FC236}">
                 <a16:creationId xmlns:a16="http://schemas.microsoft.com/office/drawing/2014/main" id="{7B4A9DAF-8D35-4BC8-B522-D3836204DAE2}"/>
               </a:ext>
             </a:extLst>
@@ -6836,7 +7978,9 @@
           </a:xfrm>
         </p:spPr>
         <p:txBody>
-          <a:bodyPr anchor="t"/>
+          <a:bodyPr anchor="t">
+            <a:normAutofit fontScale="92500"/>
+          </a:bodyPr>
           <a:lstStyle/>
           <a:p>
             <a:pPr marL="457200" indent="-457200">
@@ -6883,6 +8027,54 @@
                 <a:hlinkClick r:id="rId5"/>
               </a:rPr>
               <a:t>https://www.youtube.com/watch?v=lFbxTlD5R98</a:t>
+            </a:r>
+            <a:endParaRPr lang="en-US" dirty="0"/>
+          </a:p>
+          <a:p>
+            <a:pPr marL="457200" indent="-457200">
+              <a:buAutoNum type="arabicPeriod"/>
+            </a:pPr>
+            <a:r>
+              <a:rPr lang="en-US" dirty="0">
+                <a:hlinkClick r:id="rId6"/>
+              </a:rPr>
+              <a:t>https://arxiv.org/pdf/1908.02830.pdf</a:t>
+            </a:r>
+            <a:endParaRPr lang="en-US" dirty="0"/>
+          </a:p>
+          <a:p>
+            <a:pPr marL="457200" indent="-457200">
+              <a:buAutoNum type="arabicPeriod"/>
+            </a:pPr>
+            <a:r>
+              <a:rPr lang="en-US" dirty="0">
+                <a:hlinkClick r:id="rId7"/>
+              </a:rPr>
+              <a:t>https://www.sciencedirect.com/science/article/pii/S221282711830307X</a:t>
+            </a:r>
+            <a:endParaRPr lang="en-US" dirty="0"/>
+          </a:p>
+          <a:p>
+            <a:pPr marL="457200" indent="-457200">
+              <a:buAutoNum type="arabicPeriod"/>
+            </a:pPr>
+            <a:r>
+              <a:rPr lang="en-US" dirty="0">
+                <a:hlinkClick r:id="rId8"/>
+              </a:rPr>
+              <a:t>https://link.springer.com/article/10.1007/s11424-010-0202-3</a:t>
+            </a:r>
+            <a:endParaRPr lang="en-US" dirty="0"/>
+          </a:p>
+          <a:p>
+            <a:pPr marL="457200" indent="-457200">
+              <a:buAutoNum type="arabicPeriod"/>
+            </a:pPr>
+            <a:r>
+              <a:rPr lang="en-US" dirty="0">
+                <a:hlinkClick r:id="rId9"/>
+              </a:rPr>
+              <a:t>https://github.com/JustGlowing/minisom/blob/master/examples/Clustering.ipynb</a:t>
             </a:r>
             <a:endParaRPr lang="en-US" dirty="0"/>
           </a:p>
@@ -7771,13 +8963,10 @@
             <a:endParaRPr lang="en-US" dirty="0"/>
           </a:p>
           <a:p>
-            <a:pPr marL="457200" lvl="1" indent="0" algn="just">
-              <a:buNone/>
+            <a:pPr lvl="1" algn="just">
+              <a:buFontTx/>
+              <a:buChar char="-"/>
             </a:pPr>
-            <a:r>
-              <a:rPr lang="en-US" dirty="0"/>
-              <a:t>- </a:t>
-            </a:r>
             <a:r>
               <a:rPr lang="en-US" sz="2400" dirty="0"/>
               <a:t>T</a:t>
@@ -7811,6 +9000,35 @@
                 <a:hlinkClick r:id="rId2" action="ppaction://hlinksldjump"/>
               </a:rPr>
               <a:t>1</a:t>
+            </a:r>
+            <a:endParaRPr lang="en-US" b="1" baseline="30000" dirty="0"/>
+          </a:p>
+          <a:p>
+            <a:pPr lvl="1" algn="just">
+              <a:buFontTx/>
+              <a:buChar char="-"/>
+            </a:pPr>
+            <a:r>
+              <a:rPr lang="en-US" dirty="0"/>
+              <a:t>For implementation in Python, we can use the library called </a:t>
+            </a:r>
+            <a:r>
+              <a:rPr lang="en-US" b="1" dirty="0"/>
+              <a:t>MiniSom </a:t>
+            </a:r>
+            <a:r>
+              <a:rPr lang="en-US" b="0" i="0" dirty="0">
+                <a:solidFill>
+                  <a:srgbClr val="383838"/>
+                </a:solidFill>
+                <a:effectLst/>
+                <a:latin typeface="Inter"/>
+              </a:rPr>
+              <a:t>for performing Self Organizing Maps</a:t>
+            </a:r>
+            <a:r>
+              <a:rPr lang="en-US" b="1" dirty="0"/>
+              <a:t>.</a:t>
             </a:r>
             <a:endParaRPr lang="en-US" b="1" baseline="30000" dirty="0"/>
           </a:p>
@@ -8484,7 +9702,7 @@
         </p:nvSpPr>
         <p:spPr>
           <a:xfrm>
-            <a:off x="1681533" y="206188"/>
+            <a:off x="1780145" y="1855694"/>
             <a:ext cx="10018713" cy="6060141"/>
           </a:xfrm>
         </p:spPr>
@@ -8509,7 +9727,7 @@
             </a:pPr>
             <a:r>
               <a:rPr lang="en-US" sz="2400" dirty="0"/>
-              <a:t>Find weight values such that adjacent units have similar values.</a:t>
+              <a:t>To group objects via similarity into k-clusters using Self-Organizing Maps(SOM).</a:t>
             </a:r>
           </a:p>
           <a:p>
@@ -8524,8 +9742,20 @@
             </a:pPr>
             <a:r>
               <a:rPr lang="en-US" sz="2400" dirty="0"/>
-              <a:t>- Inputs are assigned to units that are similar to them.</a:t>
-            </a:r>
+              <a:t>- To solve this we’ll use MiniSom() from Python to implement SOM features.</a:t>
+            </a:r>
+          </a:p>
+          <a:p>
+            <a:pPr marL="457200" lvl="1" indent="0" algn="just">
+              <a:buNone/>
+            </a:pPr>
+            <a:endParaRPr lang="en-US" sz="2400" dirty="0"/>
+          </a:p>
+          <a:p>
+            <a:pPr marL="457200" lvl="1" indent="0" algn="just">
+              <a:buNone/>
+            </a:pPr>
+            <a:endParaRPr lang="en-US" sz="2400" dirty="0"/>
           </a:p>
         </p:txBody>
       </p:sp>

</xml_diff>